<commit_message>
corrections to Ex 6
</commit_message>
<xml_diff>
--- a/pres-source/11-recap-and-architecture.pptx
+++ b/pres-source/11-recap-and-architecture.pptx
@@ -229,7 +229,7 @@
           <a:p>
             <a:fld id="{D40B3A9F-5611-4548-8870-FD850D98FAAB}" type="datetimeFigureOut">
               <a:rPr lang="en-US" smtClean="0"/>
-              <a:t>3/1/19</a:t>
+              <a:t>3/6/19</a:t>
             </a:fld>
             <a:endParaRPr lang="en-US"/>
           </a:p>
@@ -399,7 +399,7 @@
             <a:fld id="{7307762F-A706-E543-A832-3C298AA3103F}" type="datetimeFigureOut">
               <a:rPr lang="en-US" smtClean="0"/>
               <a:pPr/>
-              <a:t>3/1/19</a:t>
+              <a:t>3/6/19</a:t>
             </a:fld>
             <a:endParaRPr lang="en-US" dirty="0"/>
           </a:p>
@@ -968,7 +968,7 @@
             <a:fld id="{875CF0EB-321F-0749-B37A-89BBA859503C}" type="datetimeFigureOut">
               <a:rPr lang="en-US" smtClean="0"/>
               <a:pPr/>
-              <a:t>3/1/19</a:t>
+              <a:t>3/6/19</a:t>
             </a:fld>
             <a:endParaRPr lang="en-US" dirty="0"/>
           </a:p>
@@ -1190,7 +1190,7 @@
             <a:fld id="{875CF0EB-321F-0749-B37A-89BBA859503C}" type="datetimeFigureOut">
               <a:rPr lang="en-US" smtClean="0"/>
               <a:pPr/>
-              <a:t>3/1/19</a:t>
+              <a:t>3/6/19</a:t>
             </a:fld>
             <a:endParaRPr lang="en-US" dirty="0"/>
           </a:p>
@@ -1402,7 +1402,7 @@
             <a:fld id="{875CF0EB-321F-0749-B37A-89BBA859503C}" type="datetimeFigureOut">
               <a:rPr lang="en-US" smtClean="0"/>
               <a:pPr/>
-              <a:t>3/1/19</a:t>
+              <a:t>3/6/19</a:t>
             </a:fld>
             <a:endParaRPr lang="en-US" dirty="0"/>
           </a:p>
@@ -1691,7 +1691,7 @@
             <a:fld id="{875CF0EB-321F-0749-B37A-89BBA859503C}" type="datetimeFigureOut">
               <a:rPr lang="en-US" smtClean="0"/>
               <a:pPr/>
-              <a:t>3/1/19</a:t>
+              <a:t>3/6/19</a:t>
             </a:fld>
             <a:endParaRPr lang="en-US" dirty="0"/>
           </a:p>
@@ -2020,7 +2020,7 @@
             <a:fld id="{875CF0EB-321F-0749-B37A-89BBA859503C}" type="datetimeFigureOut">
               <a:rPr lang="en-US" smtClean="0"/>
               <a:pPr/>
-              <a:t>3/1/19</a:t>
+              <a:t>3/6/19</a:t>
             </a:fld>
             <a:endParaRPr lang="en-US" dirty="0"/>
           </a:p>
@@ -2483,7 +2483,7 @@
             <a:fld id="{875CF0EB-321F-0749-B37A-89BBA859503C}" type="datetimeFigureOut">
               <a:rPr lang="en-US" smtClean="0"/>
               <a:pPr/>
-              <a:t>3/1/19</a:t>
+              <a:t>3/6/19</a:t>
             </a:fld>
             <a:endParaRPr lang="en-US" dirty="0"/>
           </a:p>
@@ -2644,7 +2644,7 @@
             <a:fld id="{875CF0EB-321F-0749-B37A-89BBA859503C}" type="datetimeFigureOut">
               <a:rPr lang="en-US" smtClean="0"/>
               <a:pPr/>
-              <a:t>3/1/19</a:t>
+              <a:t>3/6/19</a:t>
             </a:fld>
             <a:endParaRPr lang="en-US" dirty="0"/>
           </a:p>
@@ -2783,7 +2783,7 @@
             <a:fld id="{875CF0EB-321F-0749-B37A-89BBA859503C}" type="datetimeFigureOut">
               <a:rPr lang="en-US" smtClean="0"/>
               <a:pPr/>
-              <a:t>3/1/19</a:t>
+              <a:t>3/6/19</a:t>
             </a:fld>
             <a:endParaRPr lang="en-US" dirty="0"/>
           </a:p>
@@ -3102,7 +3102,7 @@
             <a:fld id="{875CF0EB-321F-0749-B37A-89BBA859503C}" type="datetimeFigureOut">
               <a:rPr lang="en-US" smtClean="0"/>
               <a:pPr/>
-              <a:t>3/1/19</a:t>
+              <a:t>3/6/19</a:t>
             </a:fld>
             <a:endParaRPr lang="en-US" dirty="0"/>
           </a:p>
@@ -3398,7 +3398,7 @@
             <a:fld id="{875CF0EB-321F-0749-B37A-89BBA859503C}" type="datetimeFigureOut">
               <a:rPr lang="en-US" smtClean="0"/>
               <a:pPr/>
-              <a:t>3/1/19</a:t>
+              <a:t>3/6/19</a:t>
             </a:fld>
             <a:endParaRPr lang="en-US" dirty="0"/>
           </a:p>
@@ -3625,14 +3625,14 @@
           </a:ln>
           <a:extLst>
             <a:ext uri="{909E8E84-426E-40dd-AFC4-6F175D3DCCD1}">
-              <a14:hiddenFill xmlns="" xmlns:a14="http://schemas.microsoft.com/office/drawing/2010/main">
+              <a14:hiddenFill xmlns:a14="http://schemas.microsoft.com/office/drawing/2010/main" xmlns="">
                 <a:solidFill>
                   <a:srgbClr val="FFFFFF"/>
                 </a:solidFill>
               </a14:hiddenFill>
             </a:ext>
             <a:ext uri="{91240B29-F687-4f45-9708-019B960494DF}">
-              <a14:hiddenLine xmlns="" xmlns:a14="http://schemas.microsoft.com/office/drawing/2010/main" w="9525">
+              <a14:hiddenLine xmlns:a14="http://schemas.microsoft.com/office/drawing/2010/main" xmlns="" w="9525">
                 <a:solidFill>
                   <a:srgbClr val="000000"/>
                 </a:solidFill>
@@ -4186,14 +4186,14 @@
           <a:noFill/>
           <a:extLst>
             <a:ext uri="{909E8E84-426E-40dd-AFC4-6F175D3DCCD1}">
-              <a14:hiddenFill xmlns="" xmlns:a14="http://schemas.microsoft.com/office/drawing/2010/main">
+              <a14:hiddenFill xmlns:a14="http://schemas.microsoft.com/office/drawing/2010/main" xmlns="">
                 <a:solidFill>
                   <a:srgbClr val="FFFFFF"/>
                 </a:solidFill>
               </a14:hiddenFill>
             </a:ext>
             <a:ext uri="{91240B29-F687-4f45-9708-019B960494DF}">
-              <a14:hiddenLine xmlns="" xmlns:a14="http://schemas.microsoft.com/office/drawing/2010/main" w="9525">
+              <a14:hiddenLine xmlns:a14="http://schemas.microsoft.com/office/drawing/2010/main" xmlns="" w="9525">
                 <a:solidFill>
                   <a:srgbClr val="000000"/>
                 </a:solidFill>
@@ -4278,14 +4278,14 @@
           <a:noFill/>
           <a:extLst>
             <a:ext uri="{909E8E84-426E-40dd-AFC4-6F175D3DCCD1}">
-              <a14:hiddenFill xmlns="" xmlns:a14="http://schemas.microsoft.com/office/drawing/2010/main">
+              <a14:hiddenFill xmlns:a14="http://schemas.microsoft.com/office/drawing/2010/main" xmlns="">
                 <a:solidFill>
                   <a:srgbClr val="FFFFFF"/>
                 </a:solidFill>
               </a14:hiddenFill>
             </a:ext>
             <a:ext uri="{91240B29-F687-4f45-9708-019B960494DF}">
-              <a14:hiddenLine xmlns="" xmlns:a14="http://schemas.microsoft.com/office/drawing/2010/main" w="9525">
+              <a14:hiddenLine xmlns:a14="http://schemas.microsoft.com/office/drawing/2010/main" xmlns="" w="9525">
                 <a:solidFill>
                   <a:srgbClr val="000000"/>
                 </a:solidFill>
@@ -4855,13 +4855,6 @@
           <a:p>
             <a:r>
               <a:rPr lang="en-US" dirty="0" err="1"/>
-              <a:t>Tez</a:t>
-            </a:r>
-            <a:endParaRPr lang="en-US" dirty="0"/>
-          </a:p>
-          <a:p>
-            <a:r>
-              <a:rPr lang="en-US" dirty="0" err="1"/>
               <a:t>etc</a:t>
             </a:r>
             <a:endParaRPr lang="en-US" dirty="0"/>
@@ -6065,14 +6058,14 @@
           <a:noFill/>
           <a:extLst>
             <a:ext uri="{909E8E84-426E-40dd-AFC4-6F175D3DCCD1}">
-              <a14:hiddenFill xmlns="" xmlns:a14="http://schemas.microsoft.com/office/drawing/2010/main">
+              <a14:hiddenFill xmlns:a14="http://schemas.microsoft.com/office/drawing/2010/main" xmlns="">
                 <a:solidFill>
                   <a:srgbClr val="FFFFFF"/>
                 </a:solidFill>
               </a14:hiddenFill>
             </a:ext>
             <a:ext uri="{91240B29-F687-4f45-9708-019B960494DF}">
-              <a14:hiddenLine xmlns="" xmlns:a14="http://schemas.microsoft.com/office/drawing/2010/main" w="9525">
+              <a14:hiddenLine xmlns:a14="http://schemas.microsoft.com/office/drawing/2010/main" xmlns="" w="9525">
                 <a:solidFill>
                   <a:srgbClr val="000000"/>
                 </a:solidFill>
@@ -6116,14 +6109,14 @@
           <a:noFill/>
           <a:extLst>
             <a:ext uri="{909E8E84-426E-40dd-AFC4-6F175D3DCCD1}">
-              <a14:hiddenFill xmlns="" xmlns:a14="http://schemas.microsoft.com/office/drawing/2010/main">
+              <a14:hiddenFill xmlns:a14="http://schemas.microsoft.com/office/drawing/2010/main" xmlns="">
                 <a:solidFill>
                   <a:srgbClr val="FFFFFF"/>
                 </a:solidFill>
               </a14:hiddenFill>
             </a:ext>
             <a:ext uri="{91240B29-F687-4f45-9708-019B960494DF}">
-              <a14:hiddenLine xmlns="" xmlns:a14="http://schemas.microsoft.com/office/drawing/2010/main" w="9525">
+              <a14:hiddenLine xmlns:a14="http://schemas.microsoft.com/office/drawing/2010/main" xmlns="" w="9525">
                 <a:solidFill>
                   <a:srgbClr val="000000"/>
                 </a:solidFill>

</xml_diff>